<commit_message>
Edited ppt document and diagram
</commit_message>
<xml_diff>
--- a/restapi-lambda-integration.pptx
+++ b/restapi-lambda-integration.pptx
@@ -275,7 +275,7 @@
           <a:p>
             <a:fld id="{F48D5CE5-8A00-47AA-BA3E-C64F1BDFCD94}" type="datetimeFigureOut">
               <a:rPr lang="en-US" smtClean="0"/>
-              <a:t>7/22/2024</a:t>
+              <a:t>7/23/2024</a:t>
             </a:fld>
             <a:endParaRPr lang="en-US"/>
           </a:p>
@@ -473,7 +473,7 @@
           <a:p>
             <a:fld id="{F48D5CE5-8A00-47AA-BA3E-C64F1BDFCD94}" type="datetimeFigureOut">
               <a:rPr lang="en-US" smtClean="0"/>
-              <a:t>7/22/2024</a:t>
+              <a:t>7/23/2024</a:t>
             </a:fld>
             <a:endParaRPr lang="en-US"/>
           </a:p>
@@ -681,7 +681,7 @@
           <a:p>
             <a:fld id="{F48D5CE5-8A00-47AA-BA3E-C64F1BDFCD94}" type="datetimeFigureOut">
               <a:rPr lang="en-US" smtClean="0"/>
-              <a:t>7/22/2024</a:t>
+              <a:t>7/23/2024</a:t>
             </a:fld>
             <a:endParaRPr lang="en-US"/>
           </a:p>
@@ -879,7 +879,7 @@
           <a:p>
             <a:fld id="{F48D5CE5-8A00-47AA-BA3E-C64F1BDFCD94}" type="datetimeFigureOut">
               <a:rPr lang="en-US" smtClean="0"/>
-              <a:t>7/22/2024</a:t>
+              <a:t>7/23/2024</a:t>
             </a:fld>
             <a:endParaRPr lang="en-US"/>
           </a:p>
@@ -1154,7 +1154,7 @@
           <a:p>
             <a:fld id="{F48D5CE5-8A00-47AA-BA3E-C64F1BDFCD94}" type="datetimeFigureOut">
               <a:rPr lang="en-US" smtClean="0"/>
-              <a:t>7/22/2024</a:t>
+              <a:t>7/23/2024</a:t>
             </a:fld>
             <a:endParaRPr lang="en-US"/>
           </a:p>
@@ -1419,7 +1419,7 @@
           <a:p>
             <a:fld id="{F48D5CE5-8A00-47AA-BA3E-C64F1BDFCD94}" type="datetimeFigureOut">
               <a:rPr lang="en-US" smtClean="0"/>
-              <a:t>7/22/2024</a:t>
+              <a:t>7/23/2024</a:t>
             </a:fld>
             <a:endParaRPr lang="en-US"/>
           </a:p>
@@ -1831,7 +1831,7 @@
           <a:p>
             <a:fld id="{F48D5CE5-8A00-47AA-BA3E-C64F1BDFCD94}" type="datetimeFigureOut">
               <a:rPr lang="en-US" smtClean="0"/>
-              <a:t>7/22/2024</a:t>
+              <a:t>7/23/2024</a:t>
             </a:fld>
             <a:endParaRPr lang="en-US"/>
           </a:p>
@@ -1972,7 +1972,7 @@
           <a:p>
             <a:fld id="{F48D5CE5-8A00-47AA-BA3E-C64F1BDFCD94}" type="datetimeFigureOut">
               <a:rPr lang="en-US" smtClean="0"/>
-              <a:t>7/22/2024</a:t>
+              <a:t>7/23/2024</a:t>
             </a:fld>
             <a:endParaRPr lang="en-US"/>
           </a:p>
@@ -2085,7 +2085,7 @@
           <a:p>
             <a:fld id="{F48D5CE5-8A00-47AA-BA3E-C64F1BDFCD94}" type="datetimeFigureOut">
               <a:rPr lang="en-US" smtClean="0"/>
-              <a:t>7/22/2024</a:t>
+              <a:t>7/23/2024</a:t>
             </a:fld>
             <a:endParaRPr lang="en-US"/>
           </a:p>
@@ -2396,7 +2396,7 @@
           <a:p>
             <a:fld id="{F48D5CE5-8A00-47AA-BA3E-C64F1BDFCD94}" type="datetimeFigureOut">
               <a:rPr lang="en-US" smtClean="0"/>
-              <a:t>7/22/2024</a:t>
+              <a:t>7/23/2024</a:t>
             </a:fld>
             <a:endParaRPr lang="en-US"/>
           </a:p>
@@ -2684,7 +2684,7 @@
           <a:p>
             <a:fld id="{F48D5CE5-8A00-47AA-BA3E-C64F1BDFCD94}" type="datetimeFigureOut">
               <a:rPr lang="en-US" smtClean="0"/>
-              <a:t>7/22/2024</a:t>
+              <a:t>7/23/2024</a:t>
             </a:fld>
             <a:endParaRPr lang="en-US"/>
           </a:p>
@@ -2925,7 +2925,7 @@
           <a:p>
             <a:fld id="{F48D5CE5-8A00-47AA-BA3E-C64F1BDFCD94}" type="datetimeFigureOut">
               <a:rPr lang="en-US" smtClean="0"/>
-              <a:t>7/22/2024</a:t>
+              <a:t>7/23/2024</a:t>
             </a:fld>
             <a:endParaRPr lang="en-US"/>
           </a:p>
@@ -4871,6 +4871,42 @@
           </a:fontRef>
         </p:style>
       </p:cxnSp>
+      <p:pic>
+        <p:nvPicPr>
+          <p:cNvPr id="6" name="Picture 5" descr="A yellow and black text&#10;&#10;Description automatically generated">
+            <a:extLst>
+              <a:ext uri="{FF2B5EF4-FFF2-40B4-BE49-F238E27FC236}">
+                <a16:creationId xmlns:a16="http://schemas.microsoft.com/office/drawing/2014/main" id="{E4A97C52-4AAA-B52D-28B8-AEE5A2E7FD01}"/>
+              </a:ext>
+            </a:extLst>
+          </p:cNvPr>
+          <p:cNvPicPr>
+            <a:picLocks noChangeAspect="1"/>
+          </p:cNvPicPr>
+          <p:nvPr/>
+        </p:nvPicPr>
+        <p:blipFill>
+          <a:blip r:embed="rId12">
+            <a:extLst>
+              <a:ext uri="{28A0092B-C50C-407E-A947-70E740481C1C}">
+                <a14:useLocalDpi xmlns:a14="http://schemas.microsoft.com/office/drawing/2010/main" val="0"/>
+              </a:ext>
+            </a:extLst>
+          </a:blip>
+          <a:stretch>
+            <a:fillRect/>
+          </a:stretch>
+        </p:blipFill>
+        <p:spPr>
+          <a:xfrm>
+            <a:off x="11073493" y="5717721"/>
+            <a:ext cx="952500" cy="952500"/>
+          </a:xfrm>
+          <a:prstGeom prst="rect">
+            <a:avLst/>
+          </a:prstGeom>
+        </p:spPr>
+      </p:pic>
     </p:spTree>
     <p:extLst>
       <p:ext uri="{BB962C8B-B14F-4D97-AF65-F5344CB8AC3E}">
@@ -4982,6 +5018,42 @@
           </a:p>
         </p:txBody>
       </p:sp>
+      <p:pic>
+        <p:nvPicPr>
+          <p:cNvPr id="4" name="Picture 3" descr="A yellow and black text&#10;&#10;Description automatically generated">
+            <a:extLst>
+              <a:ext uri="{FF2B5EF4-FFF2-40B4-BE49-F238E27FC236}">
+                <a16:creationId xmlns:a16="http://schemas.microsoft.com/office/drawing/2014/main" id="{5677E304-BCDA-1094-D387-624CC88EFC6C}"/>
+              </a:ext>
+            </a:extLst>
+          </p:cNvPr>
+          <p:cNvPicPr>
+            <a:picLocks noChangeAspect="1"/>
+          </p:cNvPicPr>
+          <p:nvPr/>
+        </p:nvPicPr>
+        <p:blipFill>
+          <a:blip r:embed="rId3">
+            <a:extLst>
+              <a:ext uri="{28A0092B-C50C-407E-A947-70E740481C1C}">
+                <a14:useLocalDpi xmlns:a14="http://schemas.microsoft.com/office/drawing/2010/main" val="0"/>
+              </a:ext>
+            </a:extLst>
+          </a:blip>
+          <a:stretch>
+            <a:fillRect/>
+          </a:stretch>
+        </p:blipFill>
+        <p:spPr>
+          <a:xfrm>
+            <a:off x="11073493" y="5717721"/>
+            <a:ext cx="952500" cy="952500"/>
+          </a:xfrm>
+          <a:prstGeom prst="rect">
+            <a:avLst/>
+          </a:prstGeom>
+        </p:spPr>
+      </p:pic>
     </p:spTree>
     <p:extLst>
       <p:ext uri="{BB962C8B-B14F-4D97-AF65-F5344CB8AC3E}">
@@ -5035,6 +5107,42 @@
           <a:xfrm>
             <a:off x="468085" y="794657"/>
             <a:ext cx="11582400" cy="5268686"/>
+          </a:xfrm>
+          <a:prstGeom prst="rect">
+            <a:avLst/>
+          </a:prstGeom>
+        </p:spPr>
+      </p:pic>
+      <p:pic>
+        <p:nvPicPr>
+          <p:cNvPr id="2" name="Picture 1" descr="A yellow and black text&#10;&#10;Description automatically generated">
+            <a:extLst>
+              <a:ext uri="{FF2B5EF4-FFF2-40B4-BE49-F238E27FC236}">
+                <a16:creationId xmlns:a16="http://schemas.microsoft.com/office/drawing/2014/main" id="{85749F5B-48C0-9423-4A10-51927F7342C1}"/>
+              </a:ext>
+            </a:extLst>
+          </p:cNvPr>
+          <p:cNvPicPr>
+            <a:picLocks noChangeAspect="1"/>
+          </p:cNvPicPr>
+          <p:nvPr/>
+        </p:nvPicPr>
+        <p:blipFill>
+          <a:blip r:embed="rId3">
+            <a:extLst>
+              <a:ext uri="{28A0092B-C50C-407E-A947-70E740481C1C}">
+                <a14:useLocalDpi xmlns:a14="http://schemas.microsoft.com/office/drawing/2010/main" val="0"/>
+              </a:ext>
+            </a:extLst>
+          </a:blip>
+          <a:stretch>
+            <a:fillRect/>
+          </a:stretch>
+        </p:blipFill>
+        <p:spPr>
+          <a:xfrm>
+            <a:off x="11073493" y="5717721"/>
+            <a:ext cx="952500" cy="952500"/>
           </a:xfrm>
           <a:prstGeom prst="rect">
             <a:avLst/>
@@ -5100,6 +5208,42 @@
           </a:prstGeom>
         </p:spPr>
       </p:pic>
+      <p:pic>
+        <p:nvPicPr>
+          <p:cNvPr id="2" name="Picture 1" descr="A yellow and black text&#10;&#10;Description automatically generated">
+            <a:extLst>
+              <a:ext uri="{FF2B5EF4-FFF2-40B4-BE49-F238E27FC236}">
+                <a16:creationId xmlns:a16="http://schemas.microsoft.com/office/drawing/2014/main" id="{6255EB6A-9527-8FAA-E3F7-88047A15B9ED}"/>
+              </a:ext>
+            </a:extLst>
+          </p:cNvPr>
+          <p:cNvPicPr>
+            <a:picLocks noChangeAspect="1"/>
+          </p:cNvPicPr>
+          <p:nvPr/>
+        </p:nvPicPr>
+        <p:blipFill>
+          <a:blip r:embed="rId3">
+            <a:extLst>
+              <a:ext uri="{28A0092B-C50C-407E-A947-70E740481C1C}">
+                <a14:useLocalDpi xmlns:a14="http://schemas.microsoft.com/office/drawing/2010/main" val="0"/>
+              </a:ext>
+            </a:extLst>
+          </a:blip>
+          <a:stretch>
+            <a:fillRect/>
+          </a:stretch>
+        </p:blipFill>
+        <p:spPr>
+          <a:xfrm>
+            <a:off x="11073493" y="5717721"/>
+            <a:ext cx="952500" cy="952500"/>
+          </a:xfrm>
+          <a:prstGeom prst="rect">
+            <a:avLst/>
+          </a:prstGeom>
+        </p:spPr>
+      </p:pic>
     </p:spTree>
     <p:extLst>
       <p:ext uri="{BB962C8B-B14F-4D97-AF65-F5344CB8AC3E}">
@@ -5211,6 +5355,42 @@
           </a:p>
         </p:txBody>
       </p:sp>
+      <p:pic>
+        <p:nvPicPr>
+          <p:cNvPr id="2" name="Picture 1" descr="A yellow and black text&#10;&#10;Description automatically generated">
+            <a:extLst>
+              <a:ext uri="{FF2B5EF4-FFF2-40B4-BE49-F238E27FC236}">
+                <a16:creationId xmlns:a16="http://schemas.microsoft.com/office/drawing/2014/main" id="{A0CCE9D7-1088-1413-524E-A27A64D3295D}"/>
+              </a:ext>
+            </a:extLst>
+          </p:cNvPr>
+          <p:cNvPicPr>
+            <a:picLocks noChangeAspect="1"/>
+          </p:cNvPicPr>
+          <p:nvPr/>
+        </p:nvPicPr>
+        <p:blipFill>
+          <a:blip r:embed="rId3">
+            <a:extLst>
+              <a:ext uri="{28A0092B-C50C-407E-A947-70E740481C1C}">
+                <a14:useLocalDpi xmlns:a14="http://schemas.microsoft.com/office/drawing/2010/main" val="0"/>
+              </a:ext>
+            </a:extLst>
+          </a:blip>
+          <a:stretch>
+            <a:fillRect/>
+          </a:stretch>
+        </p:blipFill>
+        <p:spPr>
+          <a:xfrm>
+            <a:off x="11073493" y="5717721"/>
+            <a:ext cx="952500" cy="952500"/>
+          </a:xfrm>
+          <a:prstGeom prst="rect">
+            <a:avLst/>
+          </a:prstGeom>
+        </p:spPr>
+      </p:pic>
     </p:spTree>
     <p:extLst>
       <p:ext uri="{BB962C8B-B14F-4D97-AF65-F5344CB8AC3E}">
@@ -5423,6 +5603,42 @@
           </a:prstGeom>
         </p:spPr>
       </p:pic>
+      <p:pic>
+        <p:nvPicPr>
+          <p:cNvPr id="2" name="Picture 1" descr="A yellow and black text&#10;&#10;Description automatically generated">
+            <a:extLst>
+              <a:ext uri="{FF2B5EF4-FFF2-40B4-BE49-F238E27FC236}">
+                <a16:creationId xmlns:a16="http://schemas.microsoft.com/office/drawing/2014/main" id="{A2F1B2D5-B250-BD11-5E67-CEFCBA1B155A}"/>
+              </a:ext>
+            </a:extLst>
+          </p:cNvPr>
+          <p:cNvPicPr>
+            <a:picLocks noChangeAspect="1"/>
+          </p:cNvPicPr>
+          <p:nvPr/>
+        </p:nvPicPr>
+        <p:blipFill>
+          <a:blip r:embed="rId3">
+            <a:extLst>
+              <a:ext uri="{28A0092B-C50C-407E-A947-70E740481C1C}">
+                <a14:useLocalDpi xmlns:a14="http://schemas.microsoft.com/office/drawing/2010/main" val="0"/>
+              </a:ext>
+            </a:extLst>
+          </a:blip>
+          <a:stretch>
+            <a:fillRect/>
+          </a:stretch>
+        </p:blipFill>
+        <p:spPr>
+          <a:xfrm>
+            <a:off x="11073493" y="5717721"/>
+            <a:ext cx="952500" cy="952500"/>
+          </a:xfrm>
+          <a:prstGeom prst="rect">
+            <a:avLst/>
+          </a:prstGeom>
+        </p:spPr>
+      </p:pic>
     </p:spTree>
     <p:extLst>
       <p:ext uri="{BB962C8B-B14F-4D97-AF65-F5344CB8AC3E}">
@@ -5617,6 +5833,42 @@
           </a:p>
         </p:txBody>
       </p:sp>
+      <p:pic>
+        <p:nvPicPr>
+          <p:cNvPr id="5" name="Picture 4" descr="A yellow and black text&#10;&#10;Description automatically generated">
+            <a:extLst>
+              <a:ext uri="{FF2B5EF4-FFF2-40B4-BE49-F238E27FC236}">
+                <a16:creationId xmlns:a16="http://schemas.microsoft.com/office/drawing/2014/main" id="{8D3474E6-1BAA-60CF-B584-5D8F94D458FC}"/>
+              </a:ext>
+            </a:extLst>
+          </p:cNvPr>
+          <p:cNvPicPr>
+            <a:picLocks noChangeAspect="1"/>
+          </p:cNvPicPr>
+          <p:nvPr/>
+        </p:nvPicPr>
+        <p:blipFill>
+          <a:blip r:embed="rId3">
+            <a:extLst>
+              <a:ext uri="{28A0092B-C50C-407E-A947-70E740481C1C}">
+                <a14:useLocalDpi xmlns:a14="http://schemas.microsoft.com/office/drawing/2010/main" val="0"/>
+              </a:ext>
+            </a:extLst>
+          </a:blip>
+          <a:stretch>
+            <a:fillRect/>
+          </a:stretch>
+        </p:blipFill>
+        <p:spPr>
+          <a:xfrm>
+            <a:off x="11073493" y="5717721"/>
+            <a:ext cx="952500" cy="952500"/>
+          </a:xfrm>
+          <a:prstGeom prst="rect">
+            <a:avLst/>
+          </a:prstGeom>
+        </p:spPr>
+      </p:pic>
     </p:spTree>
     <p:extLst>
       <p:ext uri="{BB962C8B-B14F-4D97-AF65-F5344CB8AC3E}">
@@ -5670,6 +5922,42 @@
           <a:xfrm>
             <a:off x="0" y="827314"/>
             <a:ext cx="12192000" cy="5203371"/>
+          </a:xfrm>
+          <a:prstGeom prst="rect">
+            <a:avLst/>
+          </a:prstGeom>
+        </p:spPr>
+      </p:pic>
+      <p:pic>
+        <p:nvPicPr>
+          <p:cNvPr id="2" name="Picture 1" descr="A yellow and black text&#10;&#10;Description automatically generated">
+            <a:extLst>
+              <a:ext uri="{FF2B5EF4-FFF2-40B4-BE49-F238E27FC236}">
+                <a16:creationId xmlns:a16="http://schemas.microsoft.com/office/drawing/2014/main" id="{0C86959A-CE72-77E1-0CCB-E8BACE18481B}"/>
+              </a:ext>
+            </a:extLst>
+          </p:cNvPr>
+          <p:cNvPicPr>
+            <a:picLocks noChangeAspect="1"/>
+          </p:cNvPicPr>
+          <p:nvPr/>
+        </p:nvPicPr>
+        <p:blipFill>
+          <a:blip r:embed="rId3">
+            <a:extLst>
+              <a:ext uri="{28A0092B-C50C-407E-A947-70E740481C1C}">
+                <a14:useLocalDpi xmlns:a14="http://schemas.microsoft.com/office/drawing/2010/main" val="0"/>
+              </a:ext>
+            </a:extLst>
+          </a:blip>
+          <a:stretch>
+            <a:fillRect/>
+          </a:stretch>
+        </p:blipFill>
+        <p:spPr>
+          <a:xfrm>
+            <a:off x="11073493" y="5717721"/>
+            <a:ext cx="952500" cy="952500"/>
           </a:xfrm>
           <a:prstGeom prst="rect">
             <a:avLst/>
@@ -5735,6 +6023,42 @@
           </a:prstGeom>
         </p:spPr>
       </p:pic>
+      <p:pic>
+        <p:nvPicPr>
+          <p:cNvPr id="4" name="Picture 3" descr="A yellow and black text&#10;&#10;Description automatically generated">
+            <a:extLst>
+              <a:ext uri="{FF2B5EF4-FFF2-40B4-BE49-F238E27FC236}">
+                <a16:creationId xmlns:a16="http://schemas.microsoft.com/office/drawing/2014/main" id="{AA270A13-4871-F358-697E-C20DFDA92859}"/>
+              </a:ext>
+            </a:extLst>
+          </p:cNvPr>
+          <p:cNvPicPr>
+            <a:picLocks noChangeAspect="1"/>
+          </p:cNvPicPr>
+          <p:nvPr/>
+        </p:nvPicPr>
+        <p:blipFill>
+          <a:blip r:embed="rId3">
+            <a:extLst>
+              <a:ext uri="{28A0092B-C50C-407E-A947-70E740481C1C}">
+                <a14:useLocalDpi xmlns:a14="http://schemas.microsoft.com/office/drawing/2010/main" val="0"/>
+              </a:ext>
+            </a:extLst>
+          </a:blip>
+          <a:stretch>
+            <a:fillRect/>
+          </a:stretch>
+        </p:blipFill>
+        <p:spPr>
+          <a:xfrm>
+            <a:off x="11073493" y="5717721"/>
+            <a:ext cx="952500" cy="952500"/>
+          </a:xfrm>
+          <a:prstGeom prst="rect">
+            <a:avLst/>
+          </a:prstGeom>
+        </p:spPr>
+      </p:pic>
     </p:spTree>
     <p:extLst>
       <p:ext uri="{BB962C8B-B14F-4D97-AF65-F5344CB8AC3E}">
@@ -5853,6 +6177,42 @@
           </a:p>
         </p:txBody>
       </p:sp>
+      <p:pic>
+        <p:nvPicPr>
+          <p:cNvPr id="4" name="Picture 3" descr="A yellow and black text&#10;&#10;Description automatically generated">
+            <a:extLst>
+              <a:ext uri="{FF2B5EF4-FFF2-40B4-BE49-F238E27FC236}">
+                <a16:creationId xmlns:a16="http://schemas.microsoft.com/office/drawing/2014/main" id="{01D4843B-3390-85CF-06C3-78B13192CED4}"/>
+              </a:ext>
+            </a:extLst>
+          </p:cNvPr>
+          <p:cNvPicPr>
+            <a:picLocks noChangeAspect="1"/>
+          </p:cNvPicPr>
+          <p:nvPr/>
+        </p:nvPicPr>
+        <p:blipFill>
+          <a:blip r:embed="rId3">
+            <a:extLst>
+              <a:ext uri="{28A0092B-C50C-407E-A947-70E740481C1C}">
+                <a14:useLocalDpi xmlns:a14="http://schemas.microsoft.com/office/drawing/2010/main" val="0"/>
+              </a:ext>
+            </a:extLst>
+          </a:blip>
+          <a:stretch>
+            <a:fillRect/>
+          </a:stretch>
+        </p:blipFill>
+        <p:spPr>
+          <a:xfrm>
+            <a:off x="11073493" y="5717721"/>
+            <a:ext cx="952500" cy="952500"/>
+          </a:xfrm>
+          <a:prstGeom prst="rect">
+            <a:avLst/>
+          </a:prstGeom>
+        </p:spPr>
+      </p:pic>
     </p:spTree>
     <p:extLst>
       <p:ext uri="{BB962C8B-B14F-4D97-AF65-F5344CB8AC3E}">
@@ -5906,6 +6266,42 @@
           <a:xfrm>
             <a:off x="141514" y="805543"/>
             <a:ext cx="12050486" cy="5246914"/>
+          </a:xfrm>
+          <a:prstGeom prst="rect">
+            <a:avLst/>
+          </a:prstGeom>
+        </p:spPr>
+      </p:pic>
+      <p:pic>
+        <p:nvPicPr>
+          <p:cNvPr id="2" name="Picture 1" descr="A yellow and black text&#10;&#10;Description automatically generated">
+            <a:extLst>
+              <a:ext uri="{FF2B5EF4-FFF2-40B4-BE49-F238E27FC236}">
+                <a16:creationId xmlns:a16="http://schemas.microsoft.com/office/drawing/2014/main" id="{B92FB624-ABD2-829B-4CE9-EB8B6554E075}"/>
+              </a:ext>
+            </a:extLst>
+          </p:cNvPr>
+          <p:cNvPicPr>
+            <a:picLocks noChangeAspect="1"/>
+          </p:cNvPicPr>
+          <p:nvPr/>
+        </p:nvPicPr>
+        <p:blipFill>
+          <a:blip r:embed="rId3">
+            <a:extLst>
+              <a:ext uri="{28A0092B-C50C-407E-A947-70E740481C1C}">
+                <a14:useLocalDpi xmlns:a14="http://schemas.microsoft.com/office/drawing/2010/main" val="0"/>
+              </a:ext>
+            </a:extLst>
+          </a:blip>
+          <a:stretch>
+            <a:fillRect/>
+          </a:stretch>
+        </p:blipFill>
+        <p:spPr>
+          <a:xfrm>
+            <a:off x="11073493" y="5717721"/>
+            <a:ext cx="952500" cy="952500"/>
           </a:xfrm>
           <a:prstGeom prst="rect">
             <a:avLst/>
@@ -6177,6 +6573,42 @@
           </a:p>
         </p:txBody>
       </p:sp>
+      <p:pic>
+        <p:nvPicPr>
+          <p:cNvPr id="5" name="Picture 4" descr="A yellow and black text&#10;&#10;Description automatically generated">
+            <a:extLst>
+              <a:ext uri="{FF2B5EF4-FFF2-40B4-BE49-F238E27FC236}">
+                <a16:creationId xmlns:a16="http://schemas.microsoft.com/office/drawing/2014/main" id="{7DBE6223-EBDA-2851-3764-F8E3AC927D6A}"/>
+              </a:ext>
+            </a:extLst>
+          </p:cNvPr>
+          <p:cNvPicPr>
+            <a:picLocks noChangeAspect="1"/>
+          </p:cNvPicPr>
+          <p:nvPr/>
+        </p:nvPicPr>
+        <p:blipFill>
+          <a:blip r:embed="rId3">
+            <a:extLst>
+              <a:ext uri="{28A0092B-C50C-407E-A947-70E740481C1C}">
+                <a14:useLocalDpi xmlns:a14="http://schemas.microsoft.com/office/drawing/2010/main" val="0"/>
+              </a:ext>
+            </a:extLst>
+          </a:blip>
+          <a:stretch>
+            <a:fillRect/>
+          </a:stretch>
+        </p:blipFill>
+        <p:spPr>
+          <a:xfrm>
+            <a:off x="11073493" y="5717721"/>
+            <a:ext cx="952500" cy="952500"/>
+          </a:xfrm>
+          <a:prstGeom prst="rect">
+            <a:avLst/>
+          </a:prstGeom>
+        </p:spPr>
+      </p:pic>
     </p:spTree>
     <p:extLst>
       <p:ext uri="{BB962C8B-B14F-4D97-AF65-F5344CB8AC3E}">
@@ -6288,6 +6720,42 @@
           </a:p>
         </p:txBody>
       </p:sp>
+      <p:pic>
+        <p:nvPicPr>
+          <p:cNvPr id="2" name="Picture 1" descr="A yellow and black text&#10;&#10;Description automatically generated">
+            <a:extLst>
+              <a:ext uri="{FF2B5EF4-FFF2-40B4-BE49-F238E27FC236}">
+                <a16:creationId xmlns:a16="http://schemas.microsoft.com/office/drawing/2014/main" id="{AEF0875C-2767-E51B-D9A6-D2F6F55D2C6F}"/>
+              </a:ext>
+            </a:extLst>
+          </p:cNvPr>
+          <p:cNvPicPr>
+            <a:picLocks noChangeAspect="1"/>
+          </p:cNvPicPr>
+          <p:nvPr/>
+        </p:nvPicPr>
+        <p:blipFill>
+          <a:blip r:embed="rId3">
+            <a:extLst>
+              <a:ext uri="{28A0092B-C50C-407E-A947-70E740481C1C}">
+                <a14:useLocalDpi xmlns:a14="http://schemas.microsoft.com/office/drawing/2010/main" val="0"/>
+              </a:ext>
+            </a:extLst>
+          </a:blip>
+          <a:stretch>
+            <a:fillRect/>
+          </a:stretch>
+        </p:blipFill>
+        <p:spPr>
+          <a:xfrm>
+            <a:off x="11073493" y="5717721"/>
+            <a:ext cx="952500" cy="952500"/>
+          </a:xfrm>
+          <a:prstGeom prst="rect">
+            <a:avLst/>
+          </a:prstGeom>
+        </p:spPr>
+      </p:pic>
     </p:spTree>
     <p:extLst>
       <p:ext uri="{BB962C8B-B14F-4D97-AF65-F5344CB8AC3E}">
@@ -6399,6 +6867,42 @@
           </a:p>
         </p:txBody>
       </p:sp>
+      <p:pic>
+        <p:nvPicPr>
+          <p:cNvPr id="2" name="Picture 1" descr="A yellow and black text&#10;&#10;Description automatically generated">
+            <a:extLst>
+              <a:ext uri="{FF2B5EF4-FFF2-40B4-BE49-F238E27FC236}">
+                <a16:creationId xmlns:a16="http://schemas.microsoft.com/office/drawing/2014/main" id="{A1C047D6-BABA-268B-B5D6-2BDD86F4DF91}"/>
+              </a:ext>
+            </a:extLst>
+          </p:cNvPr>
+          <p:cNvPicPr>
+            <a:picLocks noChangeAspect="1"/>
+          </p:cNvPicPr>
+          <p:nvPr/>
+        </p:nvPicPr>
+        <p:blipFill>
+          <a:blip r:embed="rId3">
+            <a:extLst>
+              <a:ext uri="{28A0092B-C50C-407E-A947-70E740481C1C}">
+                <a14:useLocalDpi xmlns:a14="http://schemas.microsoft.com/office/drawing/2010/main" val="0"/>
+              </a:ext>
+            </a:extLst>
+          </a:blip>
+          <a:stretch>
+            <a:fillRect/>
+          </a:stretch>
+        </p:blipFill>
+        <p:spPr>
+          <a:xfrm>
+            <a:off x="11073493" y="5717721"/>
+            <a:ext cx="952500" cy="952500"/>
+          </a:xfrm>
+          <a:prstGeom prst="rect">
+            <a:avLst/>
+          </a:prstGeom>
+        </p:spPr>
+      </p:pic>
     </p:spTree>
     <p:extLst>
       <p:ext uri="{BB962C8B-B14F-4D97-AF65-F5344CB8AC3E}">
@@ -6510,6 +7014,42 @@
           </a:p>
         </p:txBody>
       </p:sp>
+      <p:pic>
+        <p:nvPicPr>
+          <p:cNvPr id="2" name="Picture 1" descr="A yellow and black text&#10;&#10;Description automatically generated">
+            <a:extLst>
+              <a:ext uri="{FF2B5EF4-FFF2-40B4-BE49-F238E27FC236}">
+                <a16:creationId xmlns:a16="http://schemas.microsoft.com/office/drawing/2014/main" id="{8C9F26EB-B03B-B6FD-FA0A-7174BC4CE7AB}"/>
+              </a:ext>
+            </a:extLst>
+          </p:cNvPr>
+          <p:cNvPicPr>
+            <a:picLocks noChangeAspect="1"/>
+          </p:cNvPicPr>
+          <p:nvPr/>
+        </p:nvPicPr>
+        <p:blipFill>
+          <a:blip r:embed="rId3">
+            <a:extLst>
+              <a:ext uri="{28A0092B-C50C-407E-A947-70E740481C1C}">
+                <a14:useLocalDpi xmlns:a14="http://schemas.microsoft.com/office/drawing/2010/main" val="0"/>
+              </a:ext>
+            </a:extLst>
+          </a:blip>
+          <a:stretch>
+            <a:fillRect/>
+          </a:stretch>
+        </p:blipFill>
+        <p:spPr>
+          <a:xfrm>
+            <a:off x="11073493" y="5717721"/>
+            <a:ext cx="952500" cy="952500"/>
+          </a:xfrm>
+          <a:prstGeom prst="rect">
+            <a:avLst/>
+          </a:prstGeom>
+        </p:spPr>
+      </p:pic>
     </p:spTree>
     <p:extLst>
       <p:ext uri="{BB962C8B-B14F-4D97-AF65-F5344CB8AC3E}">
@@ -6621,6 +7161,42 @@
           </a:p>
         </p:txBody>
       </p:sp>
+      <p:pic>
+        <p:nvPicPr>
+          <p:cNvPr id="2" name="Picture 1" descr="A yellow and black text&#10;&#10;Description automatically generated">
+            <a:extLst>
+              <a:ext uri="{FF2B5EF4-FFF2-40B4-BE49-F238E27FC236}">
+                <a16:creationId xmlns:a16="http://schemas.microsoft.com/office/drawing/2014/main" id="{B1009B9A-0CF9-EABC-071A-0E1FC3998CDE}"/>
+              </a:ext>
+            </a:extLst>
+          </p:cNvPr>
+          <p:cNvPicPr>
+            <a:picLocks noChangeAspect="1"/>
+          </p:cNvPicPr>
+          <p:nvPr/>
+        </p:nvPicPr>
+        <p:blipFill>
+          <a:blip r:embed="rId3">
+            <a:extLst>
+              <a:ext uri="{28A0092B-C50C-407E-A947-70E740481C1C}">
+                <a14:useLocalDpi xmlns:a14="http://schemas.microsoft.com/office/drawing/2010/main" val="0"/>
+              </a:ext>
+            </a:extLst>
+          </a:blip>
+          <a:stretch>
+            <a:fillRect/>
+          </a:stretch>
+        </p:blipFill>
+        <p:spPr>
+          <a:xfrm>
+            <a:off x="11073493" y="5717721"/>
+            <a:ext cx="952500" cy="952500"/>
+          </a:xfrm>
+          <a:prstGeom prst="rect">
+            <a:avLst/>
+          </a:prstGeom>
+        </p:spPr>
+      </p:pic>
     </p:spTree>
     <p:extLst>
       <p:ext uri="{BB962C8B-B14F-4D97-AF65-F5344CB8AC3E}">
@@ -6876,6 +7452,42 @@
           </a:p>
         </p:txBody>
       </p:sp>
+      <p:pic>
+        <p:nvPicPr>
+          <p:cNvPr id="2" name="Picture 1" descr="A yellow and black text&#10;&#10;Description automatically generated">
+            <a:extLst>
+              <a:ext uri="{FF2B5EF4-FFF2-40B4-BE49-F238E27FC236}">
+                <a16:creationId xmlns:a16="http://schemas.microsoft.com/office/drawing/2014/main" id="{2868A20E-A00F-3581-19EA-6D5C52E7BF74}"/>
+              </a:ext>
+            </a:extLst>
+          </p:cNvPr>
+          <p:cNvPicPr>
+            <a:picLocks noChangeAspect="1"/>
+          </p:cNvPicPr>
+          <p:nvPr/>
+        </p:nvPicPr>
+        <p:blipFill>
+          <a:blip r:embed="rId3">
+            <a:extLst>
+              <a:ext uri="{28A0092B-C50C-407E-A947-70E740481C1C}">
+                <a14:useLocalDpi xmlns:a14="http://schemas.microsoft.com/office/drawing/2010/main" val="0"/>
+              </a:ext>
+            </a:extLst>
+          </a:blip>
+          <a:stretch>
+            <a:fillRect/>
+          </a:stretch>
+        </p:blipFill>
+        <p:spPr>
+          <a:xfrm>
+            <a:off x="11073493" y="5717721"/>
+            <a:ext cx="952500" cy="952500"/>
+          </a:xfrm>
+          <a:prstGeom prst="rect">
+            <a:avLst/>
+          </a:prstGeom>
+        </p:spPr>
+      </p:pic>
     </p:spTree>
     <p:extLst>
       <p:ext uri="{BB962C8B-B14F-4D97-AF65-F5344CB8AC3E}">

</xml_diff>